<commit_message>
TW edit to diagram, blur optional bastion
</commit_message>
<xml_diff>
--- a/docs/deployment_guide/images/quickstart-amazon-rds-architecture-diagram-6-23-update.pptx
+++ b/docs/deployment_guide/images/quickstart-amazon-rds-architecture-diagram-6-23-update.pptx
@@ -104,6 +104,11 @@
       </a:defRPr>
     </a:lvl9pPr>
   </p:defaultTextStyle>
+  <p:extLst>
+    <p:ext uri="{EFAFB233-063F-42B5-8137-9DF3F51BA10A}">
+      <p15:sldGuideLst xmlns:p15="http://schemas.microsoft.com/office/powerpoint/2012/main"/>
+    </p:ext>
+  </p:extLst>
 </p:presentation>
 </file>
 
@@ -238,7 +243,7 @@
           <a:p>
             <a:fld id="{C758E95F-C33E-4F42-B677-D316768ADA7D}" type="datetimeFigureOut">
               <a:rPr lang="en-US" smtClean="0"/>
-              <a:t>6/14/2023</a:t>
+              <a:t>6/19/2023</a:t>
             </a:fld>
             <a:endParaRPr lang="en-US"/>
           </a:p>
@@ -408,7 +413,7 @@
           <a:p>
             <a:fld id="{C758E95F-C33E-4F42-B677-D316768ADA7D}" type="datetimeFigureOut">
               <a:rPr lang="en-US" smtClean="0"/>
-              <a:t>6/14/2023</a:t>
+              <a:t>6/19/2023</a:t>
             </a:fld>
             <a:endParaRPr lang="en-US"/>
           </a:p>
@@ -588,7 +593,7 @@
           <a:p>
             <a:fld id="{C758E95F-C33E-4F42-B677-D316768ADA7D}" type="datetimeFigureOut">
               <a:rPr lang="en-US" smtClean="0"/>
-              <a:t>6/14/2023</a:t>
+              <a:t>6/19/2023</a:t>
             </a:fld>
             <a:endParaRPr lang="en-US"/>
           </a:p>
@@ -758,7 +763,7 @@
           <a:p>
             <a:fld id="{C758E95F-C33E-4F42-B677-D316768ADA7D}" type="datetimeFigureOut">
               <a:rPr lang="en-US" smtClean="0"/>
-              <a:t>6/14/2023</a:t>
+              <a:t>6/19/2023</a:t>
             </a:fld>
             <a:endParaRPr lang="en-US"/>
           </a:p>
@@ -1002,7 +1007,7 @@
           <a:p>
             <a:fld id="{C758E95F-C33E-4F42-B677-D316768ADA7D}" type="datetimeFigureOut">
               <a:rPr lang="en-US" smtClean="0"/>
-              <a:t>6/14/2023</a:t>
+              <a:t>6/19/2023</a:t>
             </a:fld>
             <a:endParaRPr lang="en-US"/>
           </a:p>
@@ -1234,7 +1239,7 @@
           <a:p>
             <a:fld id="{C758E95F-C33E-4F42-B677-D316768ADA7D}" type="datetimeFigureOut">
               <a:rPr lang="en-US" smtClean="0"/>
-              <a:t>6/14/2023</a:t>
+              <a:t>6/19/2023</a:t>
             </a:fld>
             <a:endParaRPr lang="en-US"/>
           </a:p>
@@ -1601,7 +1606,7 @@
           <a:p>
             <a:fld id="{C758E95F-C33E-4F42-B677-D316768ADA7D}" type="datetimeFigureOut">
               <a:rPr lang="en-US" smtClean="0"/>
-              <a:t>6/14/2023</a:t>
+              <a:t>6/19/2023</a:t>
             </a:fld>
             <a:endParaRPr lang="en-US"/>
           </a:p>
@@ -1719,7 +1724,7 @@
           <a:p>
             <a:fld id="{C758E95F-C33E-4F42-B677-D316768ADA7D}" type="datetimeFigureOut">
               <a:rPr lang="en-US" smtClean="0"/>
-              <a:t>6/14/2023</a:t>
+              <a:t>6/19/2023</a:t>
             </a:fld>
             <a:endParaRPr lang="en-US"/>
           </a:p>
@@ -1814,7 +1819,7 @@
           <a:p>
             <a:fld id="{C758E95F-C33E-4F42-B677-D316768ADA7D}" type="datetimeFigureOut">
               <a:rPr lang="en-US" smtClean="0"/>
-              <a:t>6/14/2023</a:t>
+              <a:t>6/19/2023</a:t>
             </a:fld>
             <a:endParaRPr lang="en-US"/>
           </a:p>
@@ -2091,7 +2096,7 @@
           <a:p>
             <a:fld id="{C758E95F-C33E-4F42-B677-D316768ADA7D}" type="datetimeFigureOut">
               <a:rPr lang="en-US" smtClean="0"/>
-              <a:t>6/14/2023</a:t>
+              <a:t>6/19/2023</a:t>
             </a:fld>
             <a:endParaRPr lang="en-US"/>
           </a:p>
@@ -2348,7 +2353,7 @@
           <a:p>
             <a:fld id="{C758E95F-C33E-4F42-B677-D316768ADA7D}" type="datetimeFigureOut">
               <a:rPr lang="en-US" smtClean="0"/>
-              <a:t>6/14/2023</a:t>
+              <a:t>6/19/2023</a:t>
             </a:fld>
             <a:endParaRPr lang="en-US"/>
           </a:p>
@@ -2561,7 +2566,7 @@
           <a:p>
             <a:fld id="{C758E95F-C33E-4F42-B677-D316768ADA7D}" type="datetimeFigureOut">
               <a:rPr lang="en-US" smtClean="0"/>
-              <a:t>6/14/2023</a:t>
+              <a:t>6/19/2023</a:t>
             </a:fld>
             <a:endParaRPr lang="en-US"/>
           </a:p>
@@ -4974,42 +4979,6 @@
           </a:p>
         </p:txBody>
       </p:sp>
-      <p:pic>
-        <p:nvPicPr>
-          <p:cNvPr id="30" name="Graphic 29">
-            <a:extLst>
-              <a:ext uri="{FF2B5EF4-FFF2-40B4-BE49-F238E27FC236}">
-                <a16:creationId xmlns:a16="http://schemas.microsoft.com/office/drawing/2014/main" id="{8880645B-899E-465C-90A8-DFB0A3942642}"/>
-              </a:ext>
-            </a:extLst>
-          </p:cNvPr>
-          <p:cNvPicPr>
-            <a:picLocks noChangeAspect="1"/>
-          </p:cNvPicPr>
-          <p:nvPr/>
-        </p:nvPicPr>
-        <p:blipFill>
-          <a:blip r:embed="rId14">
-            <a:extLst>
-              <a:ext uri="{96DAC541-7B7A-43D3-8B79-37D633B846F1}">
-                <asvg:svgBlip xmlns:asvg="http://schemas.microsoft.com/office/drawing/2016/SVG/main" r:embed="rId15"/>
-              </a:ext>
-            </a:extLst>
-          </a:blip>
-          <a:stretch>
-            <a:fillRect/>
-          </a:stretch>
-        </p:blipFill>
-        <p:spPr>
-          <a:xfrm>
-            <a:off x="8665582" y="4311426"/>
-            <a:ext cx="457200" cy="457200"/>
-          </a:xfrm>
-          <a:prstGeom prst="rect">
-            <a:avLst/>
-          </a:prstGeom>
-        </p:spPr>
-      </p:pic>
       <p:sp>
         <p:nvSpPr>
           <p:cNvPr id="31" name="TextBox 6">
@@ -6025,6 +5994,48 @@
           </p:txBody>
         </p:sp>
       </p:grpSp>
+      <p:pic>
+        <p:nvPicPr>
+          <p:cNvPr id="42" name="Picture 41">
+            <a:extLst>
+              <a:ext uri="{FF2B5EF4-FFF2-40B4-BE49-F238E27FC236}">
+                <a16:creationId xmlns:a16="http://schemas.microsoft.com/office/drawing/2014/main" id="{6C827FBF-D949-4F79-ACE8-5FB96032E017}"/>
+              </a:ext>
+            </a:extLst>
+          </p:cNvPr>
+          <p:cNvPicPr>
+            <a:picLocks noChangeAspect="1"/>
+          </p:cNvPicPr>
+          <p:nvPr/>
+        </p:nvPicPr>
+        <p:blipFill>
+          <a:blip r:embed="rId26">
+            <a:extLst>
+              <a:ext uri="{BEBA8EAE-BF5A-486C-A8C5-ECC9F3942E4B}">
+                <a14:imgProps xmlns:a14="http://schemas.microsoft.com/office/drawing/2010/main">
+                  <a14:imgLayer r:embed="rId27">
+                    <a14:imgEffect>
+                      <a14:artisticBlur radius="4"/>
+                    </a14:imgEffect>
+                  </a14:imgLayer>
+                </a14:imgProps>
+              </a:ext>
+            </a:extLst>
+          </a:blip>
+          <a:stretch>
+            <a:fillRect/>
+          </a:stretch>
+        </p:blipFill>
+        <p:spPr>
+          <a:xfrm>
+            <a:off x="8668512" y="4315968"/>
+            <a:ext cx="457240" cy="457240"/>
+          </a:xfrm>
+          <a:prstGeom prst="rect">
+            <a:avLst/>
+          </a:prstGeom>
+        </p:spPr>
+      </p:pic>
     </p:spTree>
     <p:extLst>
       <p:ext uri="{BB962C8B-B14F-4D97-AF65-F5344CB8AC3E}">

</xml_diff>